<commit_message>
Update pptx and png
</commit_message>
<xml_diff>
--- a/docs/diagrams/HideInfoSequenceDiagrams.pptx
+++ b/docs/diagrams/HideInfoSequenceDiagrams.pptx
@@ -3621,12 +3621,20 @@
           <a:p>
             <a:pPr algn="ctr"/>
             <a:r>
+              <a:rPr lang="en-US" sz="1600" dirty="0">
+                <a:solidFill>
+                  <a:schemeClr val="bg1"/>
+                </a:solidFill>
+              </a:rPr>
+              <a:t>:</a:t>
+            </a:r>
+            <a:r>
               <a:rPr lang="en-US" sz="1600" dirty="0" err="1">
                 <a:solidFill>
                   <a:schemeClr val="bg1"/>
                 </a:solidFill>
               </a:rPr>
-              <a:t>LoanCard:UI</a:t>
+              <a:t>LoanCard</a:t>
             </a:r>
             <a:endParaRPr lang="en-SG" sz="1600" dirty="0">
               <a:solidFill>
@@ -3775,7 +3783,7 @@
                   <a:schemeClr val="bg1"/>
                 </a:solidFill>
               </a:rPr>
-              <a:t>Nric:Model</a:t>
+              <a:t>nric:Nric</a:t>
             </a:r>
             <a:endParaRPr lang="en-SG" sz="1600" dirty="0">
               <a:solidFill>
@@ -4123,7 +4131,7 @@
                   <a:schemeClr val="bg1"/>
                 </a:solidFill>
               </a:rPr>
-              <a:t>Phone:Model</a:t>
+              <a:t>phone:Phone</a:t>
             </a:r>
             <a:endParaRPr lang="en-SG" sz="1600" dirty="0">
               <a:solidFill>
@@ -4427,7 +4435,7 @@
                   <a:schemeClr val="bg1"/>
                 </a:solidFill>
               </a:rPr>
-              <a:t>Email:Model</a:t>
+              <a:t>email:Email</a:t>
             </a:r>
             <a:endParaRPr lang="en-SG" sz="1600" dirty="0">
               <a:solidFill>

</xml_diff>